<commit_message>
Rajout de la météo
Powerpoint rajoute de la météo
</commit_message>
<xml_diff>
--- a/Projet d’intégration - Légaré, Lamoureux, Lefebvre, Bisson.pptx
+++ b/Projet d’intégration - Légaré, Lamoureux, Lefebvre, Bisson.pptx
@@ -108,6 +108,11 @@
       </a:defRPr>
     </a:lvl9pPr>
   </p:defaultTextStyle>
+  <p:extLst>
+    <p:ext uri="{EFAFB233-063F-42B5-8137-9DF3F51BA10A}">
+      <p15:sldGuideLst xmlns:p15="http://schemas.microsoft.com/office/powerpoint/2012/main"/>
+    </p:ext>
+  </p:extLst>
 </p:presentation>
 </file>
 
@@ -281,7 +286,7 @@
           <a:p>
             <a:fld id="{EB168F78-A5B5-4477-BA7C-01264B75F2D1}" type="datetimeFigureOut">
               <a:rPr lang="fr-CA" smtClean="0"/>
-              <a:t>2016-01-27</a:t>
+              <a:t>2016-02-01</a:t>
             </a:fld>
             <a:endParaRPr lang="fr-CA"/>
           </a:p>
@@ -548,7 +553,7 @@
           <a:p>
             <a:fld id="{EB168F78-A5B5-4477-BA7C-01264B75F2D1}" type="datetimeFigureOut">
               <a:rPr lang="fr-CA" smtClean="0"/>
-              <a:t>2016-01-27</a:t>
+              <a:t>2016-02-01</a:t>
             </a:fld>
             <a:endParaRPr lang="fr-CA"/>
           </a:p>
@@ -779,7 +784,7 @@
           <a:p>
             <a:fld id="{EB168F78-A5B5-4477-BA7C-01264B75F2D1}" type="datetimeFigureOut">
               <a:rPr lang="fr-CA" smtClean="0"/>
-              <a:t>2016-01-27</a:t>
+              <a:t>2016-02-01</a:t>
             </a:fld>
             <a:endParaRPr lang="fr-CA"/>
           </a:p>
@@ -1089,7 +1094,7 @@
           <a:p>
             <a:fld id="{EB168F78-A5B5-4477-BA7C-01264B75F2D1}" type="datetimeFigureOut">
               <a:rPr lang="fr-CA" smtClean="0"/>
-              <a:t>2016-01-27</a:t>
+              <a:t>2016-02-01</a:t>
             </a:fld>
             <a:endParaRPr lang="fr-CA"/>
           </a:p>
@@ -1562,7 +1567,7 @@
           <a:p>
             <a:fld id="{EB168F78-A5B5-4477-BA7C-01264B75F2D1}" type="datetimeFigureOut">
               <a:rPr lang="fr-CA" smtClean="0"/>
-              <a:t>2016-01-27</a:t>
+              <a:t>2016-02-01</a:t>
             </a:fld>
             <a:endParaRPr lang="fr-CA"/>
           </a:p>
@@ -2109,7 +2114,7 @@
           <a:p>
             <a:fld id="{EB168F78-A5B5-4477-BA7C-01264B75F2D1}" type="datetimeFigureOut">
               <a:rPr lang="fr-CA" smtClean="0"/>
-              <a:t>2016-01-27</a:t>
+              <a:t>2016-02-01</a:t>
             </a:fld>
             <a:endParaRPr lang="fr-CA"/>
           </a:p>
@@ -2883,7 +2888,7 @@
           <a:p>
             <a:fld id="{EB168F78-A5B5-4477-BA7C-01264B75F2D1}" type="datetimeFigureOut">
               <a:rPr lang="fr-CA" smtClean="0"/>
-              <a:t>2016-01-27</a:t>
+              <a:t>2016-02-01</a:t>
             </a:fld>
             <a:endParaRPr lang="fr-CA"/>
           </a:p>
@@ -3058,7 +3063,7 @@
           <a:p>
             <a:fld id="{EB168F78-A5B5-4477-BA7C-01264B75F2D1}" type="datetimeFigureOut">
               <a:rPr lang="fr-CA" smtClean="0"/>
-              <a:t>2016-01-27</a:t>
+              <a:t>2016-02-01</a:t>
             </a:fld>
             <a:endParaRPr lang="fr-CA"/>
           </a:p>
@@ -3281,7 +3286,7 @@
           <a:p>
             <a:fld id="{EB168F78-A5B5-4477-BA7C-01264B75F2D1}" type="datetimeFigureOut">
               <a:rPr lang="fr-CA" smtClean="0"/>
-              <a:t>2016-01-27</a:t>
+              <a:t>2016-02-01</a:t>
             </a:fld>
             <a:endParaRPr lang="fr-CA"/>
           </a:p>
@@ -3461,7 +3466,7 @@
           <a:p>
             <a:fld id="{EB168F78-A5B5-4477-BA7C-01264B75F2D1}" type="datetimeFigureOut">
               <a:rPr lang="fr-CA" smtClean="0"/>
-              <a:t>2016-01-27</a:t>
+              <a:t>2016-02-01</a:t>
             </a:fld>
             <a:endParaRPr lang="fr-CA"/>
           </a:p>
@@ -3750,7 +3755,7 @@
           <a:p>
             <a:fld id="{EB168F78-A5B5-4477-BA7C-01264B75F2D1}" type="datetimeFigureOut">
               <a:rPr lang="fr-CA" smtClean="0"/>
-              <a:t>2016-01-27</a:t>
+              <a:t>2016-02-01</a:t>
             </a:fld>
             <a:endParaRPr lang="fr-CA"/>
           </a:p>
@@ -3992,7 +3997,7 @@
           <a:p>
             <a:fld id="{EB168F78-A5B5-4477-BA7C-01264B75F2D1}" type="datetimeFigureOut">
               <a:rPr lang="fr-CA" smtClean="0"/>
-              <a:t>2016-01-27</a:t>
+              <a:t>2016-02-01</a:t>
             </a:fld>
             <a:endParaRPr lang="fr-CA"/>
           </a:p>
@@ -4371,7 +4376,7 @@
           <a:p>
             <a:fld id="{EB168F78-A5B5-4477-BA7C-01264B75F2D1}" type="datetimeFigureOut">
               <a:rPr lang="fr-CA" smtClean="0"/>
-              <a:t>2016-01-27</a:t>
+              <a:t>2016-02-01</a:t>
             </a:fld>
             <a:endParaRPr lang="fr-CA"/>
           </a:p>
@@ -4489,7 +4494,7 @@
           <a:p>
             <a:fld id="{EB168F78-A5B5-4477-BA7C-01264B75F2D1}" type="datetimeFigureOut">
               <a:rPr lang="fr-CA" smtClean="0"/>
-              <a:t>2016-01-27</a:t>
+              <a:t>2016-02-01</a:t>
             </a:fld>
             <a:endParaRPr lang="fr-CA"/>
           </a:p>
@@ -4584,7 +4589,7 @@
           <a:p>
             <a:fld id="{EB168F78-A5B5-4477-BA7C-01264B75F2D1}" type="datetimeFigureOut">
               <a:rPr lang="fr-CA" smtClean="0"/>
-              <a:t>2016-01-27</a:t>
+              <a:t>2016-02-01</a:t>
             </a:fld>
             <a:endParaRPr lang="fr-CA"/>
           </a:p>
@@ -4833,7 +4838,7 @@
           <a:p>
             <a:fld id="{EB168F78-A5B5-4477-BA7C-01264B75F2D1}" type="datetimeFigureOut">
               <a:rPr lang="fr-CA" smtClean="0"/>
-              <a:t>2016-01-27</a:t>
+              <a:t>2016-02-01</a:t>
             </a:fld>
             <a:endParaRPr lang="fr-CA"/>
           </a:p>
@@ -5090,7 +5095,7 @@
           <a:p>
             <a:fld id="{EB168F78-A5B5-4477-BA7C-01264B75F2D1}" type="datetimeFigureOut">
               <a:rPr lang="fr-CA" smtClean="0"/>
-              <a:t>2016-01-27</a:t>
+              <a:t>2016-02-01</a:t>
             </a:fld>
             <a:endParaRPr lang="fr-CA"/>
           </a:p>
@@ -5333,7 +5338,7 @@
           <a:p>
             <a:fld id="{EB168F78-A5B5-4477-BA7C-01264B75F2D1}" type="datetimeFigureOut">
               <a:rPr lang="fr-CA" smtClean="0"/>
-              <a:t>2016-01-27</a:t>
+              <a:t>2016-02-01</a:t>
             </a:fld>
             <a:endParaRPr lang="fr-CA"/>
           </a:p>
@@ -6195,7 +6200,11 @@
           <a:bodyPr/>
           <a:lstStyle/>
           <a:p>
-            <a:endParaRPr lang="fr-CA"/>
+            <a:r>
+              <a:rPr lang="fr-CA" dirty="0" smtClean="0"/>
+              <a:t>Météo</a:t>
+            </a:r>
+            <a:endParaRPr lang="fr-CA" dirty="0"/>
           </a:p>
         </p:txBody>
       </p:sp>
@@ -6214,7 +6223,7 @@
           <a:bodyPr/>
           <a:lstStyle/>
           <a:p>
-            <a:endParaRPr lang="fr-CA"/>
+            <a:endParaRPr lang="fr-CA" dirty="0"/>
           </a:p>
         </p:txBody>
       </p:sp>

</xml_diff>